<commit_message>
ajustes de notebooks, y sin exito en streamlit
</commit_message>
<xml_diff>
--- a/docs/Presentación_JuanML.pptx
+++ b/docs/Presentación_JuanML.pptx
@@ -16,6 +16,7 @@
     <p:sldId id="265" r:id="rId10"/>
     <p:sldId id="268" r:id="rId11"/>
     <p:sldId id="267" r:id="rId12"/>
+    <p:sldId id="269" r:id="rId13"/>
   </p:sldIdLst>
   <p:sldSz cx="12192000" cy="6858000"/>
   <p:notesSz cx="6858000" cy="9144000"/>
@@ -114,6 +115,11 @@
       </a:defRPr>
     </a:lvl9pPr>
   </p:defaultTextStyle>
+  <p:extLst>
+    <p:ext uri="{EFAFB233-063F-42B5-8137-9DF3F51BA10A}">
+      <p15:sldGuideLst xmlns:p15="http://schemas.microsoft.com/office/powerpoint/2012/main"/>
+    </p:ext>
+  </p:extLst>
 </p:presentation>
 </file>
 
@@ -264,7 +270,7 @@
           <a:p>
             <a:fld id="{6AA7775D-BD5A-4DEF-92C5-B28EB30B144C}" type="datetimeFigureOut">
               <a:rPr lang="es-ES" smtClean="0"/>
-              <a:t>28/06/2023</a:t>
+              <a:t>29/06/2023</a:t>
             </a:fld>
             <a:endParaRPr lang="es-ES"/>
           </a:p>
@@ -462,7 +468,7 @@
           <a:p>
             <a:fld id="{6AA7775D-BD5A-4DEF-92C5-B28EB30B144C}" type="datetimeFigureOut">
               <a:rPr lang="es-ES" smtClean="0"/>
-              <a:t>28/06/2023</a:t>
+              <a:t>29/06/2023</a:t>
             </a:fld>
             <a:endParaRPr lang="es-ES"/>
           </a:p>
@@ -670,7 +676,7 @@
           <a:p>
             <a:fld id="{6AA7775D-BD5A-4DEF-92C5-B28EB30B144C}" type="datetimeFigureOut">
               <a:rPr lang="es-ES" smtClean="0"/>
-              <a:t>28/06/2023</a:t>
+              <a:t>29/06/2023</a:t>
             </a:fld>
             <a:endParaRPr lang="es-ES"/>
           </a:p>
@@ -868,7 +874,7 @@
           <a:p>
             <a:fld id="{6AA7775D-BD5A-4DEF-92C5-B28EB30B144C}" type="datetimeFigureOut">
               <a:rPr lang="es-ES" smtClean="0"/>
-              <a:t>28/06/2023</a:t>
+              <a:t>29/06/2023</a:t>
             </a:fld>
             <a:endParaRPr lang="es-ES"/>
           </a:p>
@@ -1143,7 +1149,7 @@
           <a:p>
             <a:fld id="{6AA7775D-BD5A-4DEF-92C5-B28EB30B144C}" type="datetimeFigureOut">
               <a:rPr lang="es-ES" smtClean="0"/>
-              <a:t>28/06/2023</a:t>
+              <a:t>29/06/2023</a:t>
             </a:fld>
             <a:endParaRPr lang="es-ES"/>
           </a:p>
@@ -1408,7 +1414,7 @@
           <a:p>
             <a:fld id="{6AA7775D-BD5A-4DEF-92C5-B28EB30B144C}" type="datetimeFigureOut">
               <a:rPr lang="es-ES" smtClean="0"/>
-              <a:t>28/06/2023</a:t>
+              <a:t>29/06/2023</a:t>
             </a:fld>
             <a:endParaRPr lang="es-ES"/>
           </a:p>
@@ -1820,7 +1826,7 @@
           <a:p>
             <a:fld id="{6AA7775D-BD5A-4DEF-92C5-B28EB30B144C}" type="datetimeFigureOut">
               <a:rPr lang="es-ES" smtClean="0"/>
-              <a:t>28/06/2023</a:t>
+              <a:t>29/06/2023</a:t>
             </a:fld>
             <a:endParaRPr lang="es-ES"/>
           </a:p>
@@ -1961,7 +1967,7 @@
           <a:p>
             <a:fld id="{6AA7775D-BD5A-4DEF-92C5-B28EB30B144C}" type="datetimeFigureOut">
               <a:rPr lang="es-ES" smtClean="0"/>
-              <a:t>28/06/2023</a:t>
+              <a:t>29/06/2023</a:t>
             </a:fld>
             <a:endParaRPr lang="es-ES"/>
           </a:p>
@@ -2074,7 +2080,7 @@
           <a:p>
             <a:fld id="{6AA7775D-BD5A-4DEF-92C5-B28EB30B144C}" type="datetimeFigureOut">
               <a:rPr lang="es-ES" smtClean="0"/>
-              <a:t>28/06/2023</a:t>
+              <a:t>29/06/2023</a:t>
             </a:fld>
             <a:endParaRPr lang="es-ES"/>
           </a:p>
@@ -2385,7 +2391,7 @@
           <a:p>
             <a:fld id="{6AA7775D-BD5A-4DEF-92C5-B28EB30B144C}" type="datetimeFigureOut">
               <a:rPr lang="es-ES" smtClean="0"/>
-              <a:t>28/06/2023</a:t>
+              <a:t>29/06/2023</a:t>
             </a:fld>
             <a:endParaRPr lang="es-ES"/>
           </a:p>
@@ -2673,7 +2679,7 @@
           <a:p>
             <a:fld id="{6AA7775D-BD5A-4DEF-92C5-B28EB30B144C}" type="datetimeFigureOut">
               <a:rPr lang="es-ES" smtClean="0"/>
-              <a:t>28/06/2023</a:t>
+              <a:t>29/06/2023</a:t>
             </a:fld>
             <a:endParaRPr lang="es-ES"/>
           </a:p>
@@ -2914,7 +2920,7 @@
           <a:p>
             <a:fld id="{6AA7775D-BD5A-4DEF-92C5-B28EB30B144C}" type="datetimeFigureOut">
               <a:rPr lang="es-ES" smtClean="0"/>
-              <a:t>28/06/2023</a:t>
+              <a:t>29/06/2023</a:t>
             </a:fld>
             <a:endParaRPr lang="es-ES"/>
           </a:p>
@@ -4626,7 +4632,7 @@
           <a:p>
             <a:r>
               <a:rPr lang="es-ES" dirty="0"/>
-              <a:t>Mas socios de la clase 4, más maquinas de correr y clases</a:t>
+              <a:t>Mas socios de la clase 4, más máquinas de correr y clases</a:t>
             </a:r>
           </a:p>
           <a:p>
@@ -4653,6 +4659,197 @@
     <p:extLst>
       <p:ext uri="{BB962C8B-B14F-4D97-AF65-F5344CB8AC3E}">
         <p14:creationId xmlns:p14="http://schemas.microsoft.com/office/powerpoint/2010/main" val="3009937630"/>
+      </p:ext>
+    </p:extLst>
+  </p:cSld>
+  <p:clrMapOvr>
+    <a:masterClrMapping/>
+  </p:clrMapOvr>
+</p:sld>
+</file>
+
+<file path=ppt/slides/slide12.xml><?xml version="1.0" encoding="utf-8"?>
+<p:sld xmlns:a="http://schemas.openxmlformats.org/drawingml/2006/main" xmlns:r="http://schemas.openxmlformats.org/officeDocument/2006/relationships" xmlns:p="http://schemas.openxmlformats.org/presentationml/2006/main">
+  <p:cSld>
+    <p:spTree>
+      <p:nvGrpSpPr>
+        <p:cNvPr id="1" name=""/>
+        <p:cNvGrpSpPr/>
+        <p:nvPr/>
+      </p:nvGrpSpPr>
+      <p:grpSpPr>
+        <a:xfrm>
+          <a:off x="0" y="0"/>
+          <a:ext cx="0" cy="0"/>
+          <a:chOff x="0" y="0"/>
+          <a:chExt cx="0" cy="0"/>
+        </a:xfrm>
+      </p:grpSpPr>
+      <p:pic>
+        <p:nvPicPr>
+          <p:cNvPr id="6" name="Imagen 5" descr="Imagen que contiene interior, pequeño, tabla, viejo&#10;&#10;Descripción generada automáticamente">
+            <a:extLst>
+              <a:ext uri="{FF2B5EF4-FFF2-40B4-BE49-F238E27FC236}">
+                <a16:creationId xmlns:a16="http://schemas.microsoft.com/office/drawing/2014/main" id="{78830D9E-330B-C5A0-A1E4-1784F58CFAAF}"/>
+              </a:ext>
+            </a:extLst>
+          </p:cNvPr>
+          <p:cNvPicPr>
+            <a:picLocks noChangeAspect="1"/>
+          </p:cNvPicPr>
+          <p:nvPr/>
+        </p:nvPicPr>
+        <p:blipFill>
+          <a:blip r:embed="rId2">
+            <a:extLst>
+              <a:ext uri="{28A0092B-C50C-407E-A947-70E740481C1C}">
+                <a14:useLocalDpi xmlns:a14="http://schemas.microsoft.com/office/drawing/2010/main" val="0"/>
+              </a:ext>
+            </a:extLst>
+          </a:blip>
+          <a:stretch>
+            <a:fillRect/>
+          </a:stretch>
+        </p:blipFill>
+        <p:spPr>
+          <a:xfrm>
+            <a:off x="0" y="0"/>
+            <a:ext cx="12192000" cy="6858000"/>
+          </a:xfrm>
+          <a:prstGeom prst="rect">
+            <a:avLst/>
+          </a:prstGeom>
+        </p:spPr>
+      </p:pic>
+      <p:sp>
+        <p:nvSpPr>
+          <p:cNvPr id="9" name="Título 1">
+            <a:extLst>
+              <a:ext uri="{FF2B5EF4-FFF2-40B4-BE49-F238E27FC236}">
+                <a16:creationId xmlns:a16="http://schemas.microsoft.com/office/drawing/2014/main" id="{D26AD099-6190-EF0E-874C-7FB8526720F5}"/>
+              </a:ext>
+            </a:extLst>
+          </p:cNvPr>
+          <p:cNvSpPr txBox="1">
+            <a:spLocks/>
+          </p:cNvSpPr>
+          <p:nvPr/>
+        </p:nvSpPr>
+        <p:spPr>
+          <a:xfrm>
+            <a:off x="1302152" y="1149646"/>
+            <a:ext cx="9144000" cy="2387600"/>
+          </a:xfrm>
+          <a:prstGeom prst="rect">
+            <a:avLst/>
+          </a:prstGeom>
+        </p:spPr>
+        <p:txBody>
+          <a:bodyPr vert="horz" lIns="91440" tIns="45720" rIns="91440" bIns="45720" rtlCol="0" anchor="t">
+            <a:normAutofit/>
+          </a:bodyPr>
+          <a:lstStyle>
+            <a:lvl1pPr algn="ctr" defTabSz="914400" rtl="0" eaLnBrk="1" latinLnBrk="0" hangingPunct="1">
+              <a:lnSpc>
+                <a:spcPct val="90000"/>
+              </a:lnSpc>
+              <a:spcBef>
+                <a:spcPct val="0"/>
+              </a:spcBef>
+              <a:buNone/>
+              <a:defRPr sz="6000" kern="1200">
+                <a:solidFill>
+                  <a:schemeClr val="tx1"/>
+                </a:solidFill>
+                <a:latin typeface="+mj-lt"/>
+                <a:ea typeface="+mj-ea"/>
+                <a:cs typeface="+mj-cs"/>
+              </a:defRPr>
+            </a:lvl1pPr>
+          </a:lstStyle>
+          <a:p>
+            <a:r>
+              <a:rPr lang="es-ES" sz="8000" b="1" dirty="0">
+                <a:latin typeface="Agency FB" panose="020B0503020202020204" pitchFamily="34" charset="0"/>
+              </a:rPr>
+              <a:t>Muchas</a:t>
+            </a:r>
+            <a:r>
+              <a:rPr lang="es-ES" sz="11500" b="1" dirty="0">
+                <a:latin typeface="Agency FB" panose="020B0503020202020204" pitchFamily="34" charset="0"/>
+              </a:rPr>
+              <a:t> </a:t>
+            </a:r>
+            <a:r>
+              <a:rPr lang="es-ES" sz="8000" b="1" dirty="0">
+                <a:latin typeface="Agency FB" panose="020B0503020202020204" pitchFamily="34" charset="0"/>
+              </a:rPr>
+              <a:t>gracias</a:t>
+            </a:r>
+            <a:endParaRPr lang="es-ES" sz="11500" b="1" dirty="0">
+              <a:latin typeface="Agency FB" panose="020B0503020202020204" pitchFamily="34" charset="0"/>
+            </a:endParaRPr>
+          </a:p>
+        </p:txBody>
+      </p:sp>
+      <p:sp>
+        <p:nvSpPr>
+          <p:cNvPr id="10" name="Título 1">
+            <a:extLst>
+              <a:ext uri="{FF2B5EF4-FFF2-40B4-BE49-F238E27FC236}">
+                <a16:creationId xmlns:a16="http://schemas.microsoft.com/office/drawing/2014/main" id="{51A3B105-A277-E388-5A48-E0CF32F35F32}"/>
+              </a:ext>
+            </a:extLst>
+          </p:cNvPr>
+          <p:cNvSpPr txBox="1">
+            <a:spLocks/>
+          </p:cNvSpPr>
+          <p:nvPr/>
+        </p:nvSpPr>
+        <p:spPr>
+          <a:xfrm>
+            <a:off x="1745848" y="1944545"/>
+            <a:ext cx="9026324" cy="1125447"/>
+          </a:xfrm>
+          <a:prstGeom prst="rect">
+            <a:avLst/>
+          </a:prstGeom>
+        </p:spPr>
+        <p:txBody>
+          <a:bodyPr vert="horz" lIns="91440" tIns="45720" rIns="91440" bIns="45720" rtlCol="0" anchor="t">
+            <a:normAutofit/>
+          </a:bodyPr>
+          <a:lstStyle>
+            <a:lvl1pPr algn="ctr" defTabSz="914400" rtl="0" eaLnBrk="1" latinLnBrk="0" hangingPunct="1">
+              <a:lnSpc>
+                <a:spcPct val="90000"/>
+              </a:lnSpc>
+              <a:spcBef>
+                <a:spcPct val="0"/>
+              </a:spcBef>
+              <a:buNone/>
+              <a:defRPr sz="6000" kern="1200">
+                <a:solidFill>
+                  <a:schemeClr val="tx1"/>
+                </a:solidFill>
+                <a:latin typeface="+mj-lt"/>
+                <a:ea typeface="+mj-ea"/>
+                <a:cs typeface="+mj-cs"/>
+              </a:defRPr>
+            </a:lvl1pPr>
+          </a:lstStyle>
+          <a:p>
+            <a:endParaRPr lang="es-ES" sz="4400" b="1" dirty="0">
+              <a:latin typeface="ISOCT2" panose="00000400000000000000" pitchFamily="2" charset="0"/>
+              <a:cs typeface="ISOCT2" panose="00000400000000000000" pitchFamily="2" charset="0"/>
+            </a:endParaRPr>
+          </a:p>
+        </p:txBody>
+      </p:sp>
+    </p:spTree>
+    <p:extLst>
+      <p:ext uri="{BB962C8B-B14F-4D97-AF65-F5344CB8AC3E}">
+        <p14:creationId xmlns:p14="http://schemas.microsoft.com/office/powerpoint/2010/main" val="711008898"/>
       </p:ext>
     </p:extLst>
   </p:cSld>
@@ -4901,7 +5098,7 @@
         </p:blipFill>
         <p:spPr>
           <a:xfrm>
-            <a:off x="0" y="1"/>
+            <a:off x="9331" y="9332"/>
             <a:ext cx="12192000" cy="6858000"/>
           </a:xfrm>
           <a:prstGeom prst="rect">
@@ -4994,7 +5191,7 @@
             </a:pPr>
             <a:r>
               <a:rPr lang="es-ES" sz="2000" dirty="0"/>
-              <a:t>Optimizar numero de monitores</a:t>
+              <a:t>Optimizar número de monitores</a:t>
             </a:r>
           </a:p>
           <a:p>
@@ -5213,7 +5410,7 @@
         </p:blipFill>
         <p:spPr>
           <a:xfrm>
-            <a:off x="0" y="0"/>
+            <a:off x="0" y="9331"/>
             <a:ext cx="12192000" cy="6858000"/>
           </a:xfrm>
           <a:prstGeom prst="rect">

</xml_diff>